<commit_message>
add assumptions slide, minor changes to code
</commit_message>
<xml_diff>
--- a/presentation/airbnb_causal_inference.pptx
+++ b/presentation/airbnb_causal_inference.pptx
@@ -5,10 +5,10 @@
     <p:sldMasterId id="2147483648" r:id="rId1"/>
   </p:sldMasterIdLst>
   <p:notesMasterIdLst>
-    <p:notesMasterId r:id="rId14"/>
+    <p:notesMasterId r:id="rId16"/>
   </p:notesMasterIdLst>
   <p:handoutMasterIdLst>
-    <p:handoutMasterId r:id="rId15"/>
+    <p:handoutMasterId r:id="rId17"/>
   </p:handoutMasterIdLst>
   <p:sldIdLst>
     <p:sldId id="259" r:id="rId2"/>
@@ -21,8 +21,10 @@
     <p:sldId id="268" r:id="rId9"/>
     <p:sldId id="272" r:id="rId10"/>
     <p:sldId id="269" r:id="rId11"/>
-    <p:sldId id="270" r:id="rId12"/>
-    <p:sldId id="271" r:id="rId13"/>
+    <p:sldId id="274" r:id="rId12"/>
+    <p:sldId id="273" r:id="rId13"/>
+    <p:sldId id="270" r:id="rId14"/>
+    <p:sldId id="271" r:id="rId15"/>
   </p:sldIdLst>
   <p:sldSz cx="9144000" cy="5143500" type="screen16x9"/>
   <p:notesSz cx="6858000" cy="9144000"/>
@@ -267,7 +269,7 @@
             <a:fld id="{F496D57A-E805-4084-A768-0B0F34B164C5}" type="datetimeFigureOut">
               <a:rPr lang="en-US" altLang="en-US"/>
               <a:pPr/>
-              <a:t>11/28/2020</a:t>
+              <a:t>11/29/2020</a:t>
             </a:fld>
             <a:endParaRPr lang="en-US" altLang="en-US" dirty="0"/>
           </a:p>
@@ -455,7 +457,7 @@
             <a:fld id="{EAB78CFD-5AA6-48E6-A81D-DD827D346BAD}" type="datetimeFigureOut">
               <a:rPr lang="en-US" altLang="en-US"/>
               <a:pPr/>
-              <a:t>11/28/2020</a:t>
+              <a:t>11/29/2020</a:t>
             </a:fld>
             <a:endParaRPr lang="en-US" altLang="en-US" dirty="0"/>
           </a:p>
@@ -1040,14 +1042,14 @@
           </a:ln>
           <a:extLst>
             <a:ext uri="{909E8E84-426E-40dd-AFC4-6F175D3DCCD1}">
-              <a14:hiddenFill xmlns:a14="http://schemas.microsoft.com/office/drawing/2010/main" xmlns="">
+              <a14:hiddenFill xmlns="" xmlns:a14="http://schemas.microsoft.com/office/drawing/2010/main">
                 <a:solidFill>
                   <a:srgbClr val="FFFFFF"/>
                 </a:solidFill>
               </a14:hiddenFill>
             </a:ext>
             <a:ext uri="{91240B29-F687-4f45-9708-019B960494DF}">
-              <a14:hiddenLine xmlns:a14="http://schemas.microsoft.com/office/drawing/2010/main" xmlns="" w="9525">
+              <a14:hiddenLine xmlns="" xmlns:a14="http://schemas.microsoft.com/office/drawing/2010/main" w="9525">
                 <a:solidFill>
                   <a:srgbClr val="000000"/>
                 </a:solidFill>
@@ -1620,7 +1622,7 @@
             <a:fld id="{E3678664-53E6-4E53-8D67-7EC89F15A497}" type="datetime1">
               <a:rPr lang="en-US" altLang="en-US"/>
               <a:pPr/>
-              <a:t>11/28/2020</a:t>
+              <a:t>11/29/2020</a:t>
             </a:fld>
             <a:endParaRPr lang="en-US" altLang="en-US" dirty="0"/>
           </a:p>
@@ -1855,7 +1857,7 @@
             <a:fld id="{A34D62EC-74C3-4131-8302-AF32885244FB}" type="datetime1">
               <a:rPr lang="en-US" altLang="en-US"/>
               <a:pPr/>
-              <a:t>11/28/2020</a:t>
+              <a:t>11/29/2020</a:t>
             </a:fld>
             <a:endParaRPr lang="en-US" altLang="en-US" dirty="0"/>
           </a:p>
@@ -2126,7 +2128,7 @@
             <a:fld id="{B034E42C-25F6-47D0-B98D-865D449E4271}" type="datetime1">
               <a:rPr lang="en-US" altLang="en-US"/>
               <a:pPr/>
-              <a:t>11/28/2020</a:t>
+              <a:t>11/29/2020</a:t>
             </a:fld>
             <a:endParaRPr lang="en-US" altLang="en-US" dirty="0"/>
           </a:p>
@@ -2790,6 +2792,28 @@
                 <a:spcPct val="0"/>
               </a:spcBef>
             </a:pPr>
+            <a:r>
+              <a:rPr lang="en-US" altLang="en-US" sz="1800" dirty="0" smtClean="0">
+                <a:solidFill>
+                  <a:srgbClr val="FF0000"/>
+                </a:solidFill>
+                <a:latin typeface="Arial" panose="020B0604020202020204" pitchFamily="34" charset="0"/>
+              </a:rPr>
+              <a:t>DRAFT</a:t>
+            </a:r>
+            <a:endParaRPr lang="en-US" altLang="en-US" sz="1800" dirty="0" smtClean="0">
+              <a:solidFill>
+                <a:srgbClr val="FF0000"/>
+              </a:solidFill>
+              <a:latin typeface="Arial" panose="020B0604020202020204" pitchFamily="34" charset="0"/>
+            </a:endParaRPr>
+          </a:p>
+          <a:p>
+            <a:pPr>
+              <a:spcBef>
+                <a:spcPct val="0"/>
+              </a:spcBef>
+            </a:pPr>
             <a:endParaRPr lang="en-US" altLang="en-US" sz="1200" b="0" dirty="0" smtClean="0">
               <a:latin typeface="Arial" panose="020B0604020202020204" pitchFamily="34" charset="0"/>
             </a:endParaRPr>
@@ -2849,7 +2873,6 @@
               <a:rPr lang="en-US" altLang="en-US" dirty="0" smtClean="0"/>
               <a:t>Diana Liang, Andrew Pagtakhan</a:t>
             </a:r>
-            <a:endParaRPr lang="en-US" altLang="en-US" dirty="0" smtClean="0"/>
           </a:p>
           <a:p>
             <a:pPr marL="0" indent="0">
@@ -2869,7 +2892,6 @@
               <a:rPr lang="en-US" altLang="en-US" dirty="0" smtClean="0"/>
               <a:t> , 2020</a:t>
             </a:r>
-            <a:endParaRPr lang="en-US" altLang="en-US" dirty="0" smtClean="0"/>
           </a:p>
         </p:txBody>
       </p:sp>
@@ -3008,10 +3030,6 @@
               </a:rPr>
               <a:t>Modeling</a:t>
             </a:r>
-            <a:endParaRPr lang="en-US" altLang="en-US" dirty="0" smtClean="0">
-              <a:latin typeface="Arial" panose="020B0604020202020204" pitchFamily="34" charset="0"/>
-              <a:cs typeface="Arial" panose="020B0604020202020204" pitchFamily="34" charset="0"/>
-            </a:endParaRPr>
           </a:p>
           <a:p>
             <a:pPr>
@@ -3129,7 +3147,7 @@
       </p:grpSpPr>
       <p:sp>
         <p:nvSpPr>
-          <p:cNvPr id="8193" name="Text Placeholder 2"/>
+          <p:cNvPr id="10241" name="Text Placeholder 1"/>
           <p:cNvSpPr>
             <a:spLocks noGrp="1"/>
           </p:cNvSpPr>
@@ -3139,8 +3157,8 @@
         </p:nvSpPr>
         <p:spPr bwMode="auto">
           <a:xfrm>
-            <a:off x="4997450" y="1584325"/>
-            <a:ext cx="3736975" cy="3130550"/>
+            <a:off x="501650" y="888587"/>
+            <a:ext cx="8315325" cy="3130550"/>
           </a:xfrm>
           <a:noFill/>
           <a:extLst>
@@ -3177,29 +3195,25 @@
               </a:spcBef>
             </a:pPr>
             <a:r>
-              <a:rPr lang="en-US" altLang="en-US" dirty="0" smtClean="0">
-                <a:latin typeface="Arial" panose="020B0604020202020204" pitchFamily="34" charset="0"/>
-                <a:cs typeface="Arial" panose="020B0604020202020204" pitchFamily="34" charset="0"/>
-              </a:rPr>
-              <a:t>Next Steps</a:t>
-            </a:r>
-            <a:endParaRPr lang="en-US" altLang="en-US" dirty="0" smtClean="0">
-              <a:latin typeface="Arial" panose="020B0604020202020204" pitchFamily="34" charset="0"/>
-              <a:cs typeface="Arial" panose="020B0604020202020204" pitchFamily="34" charset="0"/>
-            </a:endParaRPr>
+              <a:rPr lang="en-US" altLang="en-US" dirty="0" smtClean="0"/>
+              <a:t>In order to make causal inferences using propensity score matching, it is crucial to lay out the following framework assumptions:</a:t>
+            </a:r>
+            <a:endParaRPr lang="en-US" altLang="en-US" dirty="0" smtClean="0"/>
           </a:p>
           <a:p>
             <a:pPr>
               <a:spcBef>
                 <a:spcPct val="0"/>
               </a:spcBef>
+              <a:buAutoNum type="arabicPeriod"/>
             </a:pPr>
             <a:r>
-              <a:rPr lang="en-US" altLang="en-US" sz="1400" b="0" dirty="0" smtClean="0">
-                <a:latin typeface="Arial" panose="020B0604020202020204" pitchFamily="34" charset="0"/>
-                <a:cs typeface="Arial" panose="020B0604020202020204" pitchFamily="34" charset="0"/>
-              </a:rPr>
-              <a:t>Text description here</a:t>
+              <a:rPr lang="en-US" altLang="en-US" sz="1600" b="0" dirty="0" err="1" smtClean="0"/>
+              <a:t>Ignorability</a:t>
+            </a:r>
+            <a:r>
+              <a:rPr lang="en-US" altLang="en-US" sz="1600" b="0" dirty="0" smtClean="0"/>
+              <a:t> – all user demographics are captured in this analysis</a:t>
             </a:r>
           </a:p>
           <a:p>
@@ -3207,41 +3221,92 @@
               <a:spcBef>
                 <a:spcPct val="0"/>
               </a:spcBef>
+              <a:buAutoNum type="arabicPeriod"/>
             </a:pPr>
-            <a:endParaRPr lang="en-US" altLang="en-US" dirty="0" smtClean="0">
-              <a:latin typeface="Arial" panose="020B0604020202020204" pitchFamily="34" charset="0"/>
-              <a:cs typeface="Arial" panose="020B0604020202020204" pitchFamily="34" charset="0"/>
-            </a:endParaRPr>
+            <a:r>
+              <a:rPr lang="en-US" altLang="en-US" sz="1600" b="0" dirty="0" smtClean="0"/>
+              <a:t>Sufficien</a:t>
+            </a:r>
+            <a:r>
+              <a:rPr lang="en-US" altLang="en-US" sz="1600" b="0" dirty="0" smtClean="0"/>
+              <a:t>t overlap between treated vs. non-treated users</a:t>
+            </a:r>
+          </a:p>
+          <a:p>
+            <a:pPr>
+              <a:spcBef>
+                <a:spcPct val="0"/>
+              </a:spcBef>
+              <a:buAutoNum type="arabicPeriod"/>
+            </a:pPr>
+            <a:r>
+              <a:rPr lang="en-US" altLang="en-US" sz="1600" b="0" dirty="0" smtClean="0"/>
+              <a:t>Appropriate Specification of the propensity score is achieved</a:t>
+            </a:r>
+          </a:p>
+          <a:p>
+            <a:pPr>
+              <a:spcBef>
+                <a:spcPct val="0"/>
+              </a:spcBef>
+              <a:buAutoNum type="arabicPeriod"/>
+            </a:pPr>
+            <a:r>
+              <a:rPr lang="en-US" altLang="en-US" sz="1600" b="0" dirty="0" smtClean="0"/>
+              <a:t>SUTVA – no interference among users and no hidden versions of marketing ad treatment</a:t>
+            </a:r>
+          </a:p>
+          <a:p>
+            <a:pPr>
+              <a:spcBef>
+                <a:spcPct val="0"/>
+              </a:spcBef>
+              <a:buAutoNum type="arabicPeriod"/>
+            </a:pPr>
+            <a:endParaRPr lang="en-US" altLang="en-US" sz="1600" b="0" dirty="0" smtClean="0"/>
+          </a:p>
+          <a:p>
+            <a:pPr>
+              <a:spcBef>
+                <a:spcPct val="0"/>
+              </a:spcBef>
+              <a:buAutoNum type="arabicPeriod"/>
+            </a:pPr>
+            <a:endParaRPr lang="en-US" altLang="en-US" sz="1600" b="0" dirty="0" smtClean="0"/>
+          </a:p>
+          <a:p>
+            <a:pPr>
+              <a:spcBef>
+                <a:spcPct val="0"/>
+              </a:spcBef>
+              <a:buAutoNum type="arabicPeriod"/>
+            </a:pPr>
+            <a:endParaRPr lang="en-US" altLang="en-US" sz="1400" b="0" dirty="0" smtClean="0"/>
+          </a:p>
+          <a:p>
+            <a:pPr>
+              <a:spcBef>
+                <a:spcPct val="0"/>
+              </a:spcBef>
+            </a:pPr>
+            <a:endParaRPr lang="en-US" altLang="en-US" dirty="0" smtClean="0"/>
           </a:p>
         </p:txBody>
       </p:sp>
-      <p:pic>
-        <p:nvPicPr>
-          <p:cNvPr id="8194" name="Content Placeholder 5"/>
-          <p:cNvPicPr>
-            <a:picLocks noGrp="1" noChangeAspect="1"/>
-          </p:cNvPicPr>
+      <p:sp>
+        <p:nvSpPr>
+          <p:cNvPr id="10242" name="Text Placeholder 2"/>
+          <p:cNvSpPr>
+            <a:spLocks noGrp="1"/>
+          </p:cNvSpPr>
           <p:nvPr>
-            <p:ph idx="11"/>
+            <p:ph type="body" sz="quarter" idx="14"/>
           </p:nvPr>
-        </p:nvPicPr>
-        <p:blipFill>
-          <a:blip r:embed="rId2">
-            <a:extLst>
-              <a:ext uri="{28A0092B-C50C-407E-A947-70E740481C1C}">
-                <a14:useLocalDpi xmlns:a14="http://schemas.microsoft.com/office/drawing/2010/main" val="0"/>
-              </a:ext>
-            </a:extLst>
-          </a:blip>
-          <a:srcRect/>
-          <a:stretch>
-            <a:fillRect/>
-          </a:stretch>
-        </p:blipFill>
+        </p:nvSpPr>
         <p:spPr bwMode="auto">
           <a:xfrm>
-            <a:off x="0" y="-7938"/>
-            <a:ext cx="4492625" cy="5167313"/>
+            <a:off x="6176963" y="228600"/>
+            <a:ext cx="2740025" cy="265113"/>
           </a:xfrm>
           <a:noFill/>
           <a:extLst>
@@ -3264,11 +3329,255 @@
             </a:ext>
           </a:extLst>
         </p:spPr>
-      </p:pic>
+        <p:txBody>
+          <a:bodyPr wrap="square" numCol="1" anchor="t" anchorCtr="0" compatLnSpc="1">
+            <a:prstTxWarp prst="textNoShape">
+              <a:avLst/>
+            </a:prstTxWarp>
+          </a:bodyPr>
+          <a:lstStyle/>
+          <a:p>
+            <a:pPr>
+              <a:spcBef>
+                <a:spcPct val="0"/>
+              </a:spcBef>
+            </a:pPr>
+            <a:r>
+              <a:rPr lang="en-US" altLang="en-US" dirty="0" smtClean="0"/>
+              <a:t>Exploratory Data Analysis</a:t>
+            </a:r>
+          </a:p>
+        </p:txBody>
+      </p:sp>
+      <p:sp>
+        <p:nvSpPr>
+          <p:cNvPr id="3" name="Slide Number Placeholder 2"/>
+          <p:cNvSpPr>
+            <a:spLocks noGrp="1"/>
+          </p:cNvSpPr>
+          <p:nvPr>
+            <p:ph type="sldNum" sz="quarter" idx="16"/>
+          </p:nvPr>
+        </p:nvSpPr>
+        <p:spPr/>
+        <p:txBody>
+          <a:bodyPr/>
+          <a:lstStyle>
+            <a:lvl1pPr eaLnBrk="0" hangingPunct="0">
+              <a:defRPr sz="2400">
+                <a:solidFill>
+                  <a:schemeClr val="tx1"/>
+                </a:solidFill>
+                <a:latin typeface="Arial" panose="020B0604020202020204" pitchFamily="34" charset="0"/>
+                <a:ea typeface="MS PGothic" panose="020B0600070205080204" pitchFamily="34" charset="-128"/>
+              </a:defRPr>
+            </a:lvl1pPr>
+            <a:lvl2pPr marL="742950" indent="-285750" eaLnBrk="0" hangingPunct="0">
+              <a:defRPr sz="2400">
+                <a:solidFill>
+                  <a:schemeClr val="tx1"/>
+                </a:solidFill>
+                <a:latin typeface="Arial" panose="020B0604020202020204" pitchFamily="34" charset="0"/>
+                <a:ea typeface="MS PGothic" panose="020B0600070205080204" pitchFamily="34" charset="-128"/>
+              </a:defRPr>
+            </a:lvl2pPr>
+            <a:lvl3pPr marL="1143000" indent="-228600" eaLnBrk="0" hangingPunct="0">
+              <a:defRPr sz="2400">
+                <a:solidFill>
+                  <a:schemeClr val="tx1"/>
+                </a:solidFill>
+                <a:latin typeface="Arial" panose="020B0604020202020204" pitchFamily="34" charset="0"/>
+                <a:ea typeface="MS PGothic" panose="020B0600070205080204" pitchFamily="34" charset="-128"/>
+              </a:defRPr>
+            </a:lvl3pPr>
+            <a:lvl4pPr marL="1600200" indent="-228600" eaLnBrk="0" hangingPunct="0">
+              <a:defRPr sz="2400">
+                <a:solidFill>
+                  <a:schemeClr val="tx1"/>
+                </a:solidFill>
+                <a:latin typeface="Arial" panose="020B0604020202020204" pitchFamily="34" charset="0"/>
+                <a:ea typeface="MS PGothic" panose="020B0600070205080204" pitchFamily="34" charset="-128"/>
+              </a:defRPr>
+            </a:lvl4pPr>
+            <a:lvl5pPr marL="2057400" indent="-228600" eaLnBrk="0" hangingPunct="0">
+              <a:defRPr sz="2400">
+                <a:solidFill>
+                  <a:schemeClr val="tx1"/>
+                </a:solidFill>
+                <a:latin typeface="Arial" panose="020B0604020202020204" pitchFamily="34" charset="0"/>
+                <a:ea typeface="MS PGothic" panose="020B0600070205080204" pitchFamily="34" charset="-128"/>
+              </a:defRPr>
+            </a:lvl5pPr>
+            <a:lvl6pPr marL="2514600" indent="-228600" defTabSz="457200" eaLnBrk="0" fontAlgn="base" hangingPunct="0">
+              <a:spcBef>
+                <a:spcPct val="0"/>
+              </a:spcBef>
+              <a:spcAft>
+                <a:spcPct val="0"/>
+              </a:spcAft>
+              <a:defRPr sz="2400">
+                <a:solidFill>
+                  <a:schemeClr val="tx1"/>
+                </a:solidFill>
+                <a:latin typeface="Arial" panose="020B0604020202020204" pitchFamily="34" charset="0"/>
+                <a:ea typeface="MS PGothic" panose="020B0600070205080204" pitchFamily="34" charset="-128"/>
+              </a:defRPr>
+            </a:lvl6pPr>
+            <a:lvl7pPr marL="2971800" indent="-228600" defTabSz="457200" eaLnBrk="0" fontAlgn="base" hangingPunct="0">
+              <a:spcBef>
+                <a:spcPct val="0"/>
+              </a:spcBef>
+              <a:spcAft>
+                <a:spcPct val="0"/>
+              </a:spcAft>
+              <a:defRPr sz="2400">
+                <a:solidFill>
+                  <a:schemeClr val="tx1"/>
+                </a:solidFill>
+                <a:latin typeface="Arial" panose="020B0604020202020204" pitchFamily="34" charset="0"/>
+                <a:ea typeface="MS PGothic" panose="020B0600070205080204" pitchFamily="34" charset="-128"/>
+              </a:defRPr>
+            </a:lvl7pPr>
+            <a:lvl8pPr marL="3429000" indent="-228600" defTabSz="457200" eaLnBrk="0" fontAlgn="base" hangingPunct="0">
+              <a:spcBef>
+                <a:spcPct val="0"/>
+              </a:spcBef>
+              <a:spcAft>
+                <a:spcPct val="0"/>
+              </a:spcAft>
+              <a:defRPr sz="2400">
+                <a:solidFill>
+                  <a:schemeClr val="tx1"/>
+                </a:solidFill>
+                <a:latin typeface="Arial" panose="020B0604020202020204" pitchFamily="34" charset="0"/>
+                <a:ea typeface="MS PGothic" panose="020B0600070205080204" pitchFamily="34" charset="-128"/>
+              </a:defRPr>
+            </a:lvl8pPr>
+            <a:lvl9pPr marL="3886200" indent="-228600" defTabSz="457200" eaLnBrk="0" fontAlgn="base" hangingPunct="0">
+              <a:spcBef>
+                <a:spcPct val="0"/>
+              </a:spcBef>
+              <a:spcAft>
+                <a:spcPct val="0"/>
+              </a:spcAft>
+              <a:defRPr sz="2400">
+                <a:solidFill>
+                  <a:schemeClr val="tx1"/>
+                </a:solidFill>
+                <a:latin typeface="Arial" panose="020B0604020202020204" pitchFamily="34" charset="0"/>
+                <a:ea typeface="MS PGothic" panose="020B0600070205080204" pitchFamily="34" charset="-128"/>
+              </a:defRPr>
+            </a:lvl9pPr>
+          </a:lstStyle>
+          <a:p>
+            <a:pPr marL="0" marR="0" lvl="0" indent="0" algn="r" defTabSz="457200" rtl="0" eaLnBrk="1" fontAlgn="base" latinLnBrk="0" hangingPunct="1">
+              <a:lnSpc>
+                <a:spcPct val="100000"/>
+              </a:lnSpc>
+              <a:spcBef>
+                <a:spcPct val="0"/>
+              </a:spcBef>
+              <a:spcAft>
+                <a:spcPct val="0"/>
+              </a:spcAft>
+              <a:buClrTx/>
+              <a:buSzTx/>
+              <a:buFontTx/>
+              <a:buNone/>
+              <a:tabLst/>
+              <a:defRPr/>
+            </a:pPr>
+            <a:fld id="{67A30100-1FE8-4BC7-8BBC-5F0E5407A7D5}" type="slidenum">
+              <a:rPr kumimoji="0" lang="en-US" altLang="en-US" sz="1200" b="0" i="0" u="none" strike="noStrike" kern="1200" cap="none" spc="0" normalizeH="0" baseline="0" noProof="0" smtClean="0">
+                <a:ln>
+                  <a:noFill/>
+                </a:ln>
+                <a:solidFill>
+                  <a:srgbClr val="898989"/>
+                </a:solidFill>
+                <a:effectLst/>
+                <a:uLnTx/>
+                <a:uFillTx/>
+                <a:latin typeface="Arial" panose="020B0604020202020204" pitchFamily="34" charset="0"/>
+                <a:ea typeface="MS PGothic" panose="020B0600070205080204" pitchFamily="34" charset="-128"/>
+                <a:cs typeface="+mn-cs"/>
+              </a:rPr>
+              <a:pPr marL="0" marR="0" lvl="0" indent="0" algn="r" defTabSz="457200" rtl="0" eaLnBrk="1" fontAlgn="base" latinLnBrk="0" hangingPunct="1">
+                <a:lnSpc>
+                  <a:spcPct val="100000"/>
+                </a:lnSpc>
+                <a:spcBef>
+                  <a:spcPct val="0"/>
+                </a:spcBef>
+                <a:spcAft>
+                  <a:spcPct val="0"/>
+                </a:spcAft>
+                <a:buClrTx/>
+                <a:buSzTx/>
+                <a:buFontTx/>
+                <a:buNone/>
+                <a:tabLst/>
+                <a:defRPr/>
+              </a:pPr>
+              <a:t>11</a:t>
+            </a:fld>
+            <a:endParaRPr kumimoji="0" lang="en-US" altLang="en-US" sz="1200" b="0" i="0" u="none" strike="noStrike" kern="1200" cap="none" spc="0" normalizeH="0" baseline="0" noProof="0" dirty="0" smtClean="0">
+              <a:ln>
+                <a:noFill/>
+              </a:ln>
+              <a:solidFill>
+                <a:srgbClr val="898989"/>
+              </a:solidFill>
+              <a:effectLst/>
+              <a:uLnTx/>
+              <a:uFillTx/>
+              <a:latin typeface="Arial" panose="020B0604020202020204" pitchFamily="34" charset="0"/>
+              <a:ea typeface="MS PGothic" panose="020B0600070205080204" pitchFamily="34" charset="-128"/>
+              <a:cs typeface="+mn-cs"/>
+            </a:endParaRPr>
+          </a:p>
+        </p:txBody>
+      </p:sp>
+      <p:sp>
+        <p:nvSpPr>
+          <p:cNvPr id="2" name="TextBox 1"/>
+          <p:cNvSpPr txBox="1"/>
+          <p:nvPr/>
+        </p:nvSpPr>
+        <p:spPr>
+          <a:xfrm>
+            <a:off x="501650" y="4439478"/>
+            <a:ext cx="6237080" cy="215444"/>
+          </a:xfrm>
+          <a:prstGeom prst="rect">
+            <a:avLst/>
+          </a:prstGeom>
+          <a:noFill/>
+        </p:spPr>
+        <p:txBody>
+          <a:bodyPr wrap="square" rtlCol="0">
+            <a:spAutoFit/>
+          </a:bodyPr>
+          <a:lstStyle/>
+          <a:p>
+            <a:r>
+              <a:rPr lang="en-US" sz="800" dirty="0" smtClean="0"/>
+              <a:t>Source: Hill, Jennifer. APSTA-GE 2012 Topic 7, 10/02/2020. </a:t>
+            </a:r>
+            <a:r>
+              <a:rPr lang="en-US" sz="800" dirty="0">
+                <a:hlinkClick r:id="rId2"/>
+              </a:rPr>
+              <a:t>GMT20201002-133231_Causal-Inf_1760x900 (2) - NYU Stream</a:t>
+            </a:r>
+            <a:endParaRPr lang="en-US" sz="800" dirty="0"/>
+          </a:p>
+        </p:txBody>
+      </p:sp>
     </p:spTree>
     <p:extLst>
       <p:ext uri="{BB962C8B-B14F-4D97-AF65-F5344CB8AC3E}">
-        <p14:creationId xmlns:p14="http://schemas.microsoft.com/office/powerpoint/2010/main" val="4042838882"/>
+        <p14:creationId xmlns:p14="http://schemas.microsoft.com/office/powerpoint/2010/main" val="662563919"/>
       </p:ext>
     </p:extLst>
   </p:cSld>
@@ -3304,6 +3613,384 @@
       </p:grpSpPr>
       <p:sp>
         <p:nvSpPr>
+          <p:cNvPr id="10241" name="Text Placeholder 1"/>
+          <p:cNvSpPr>
+            <a:spLocks noGrp="1"/>
+          </p:cNvSpPr>
+          <p:nvPr>
+            <p:ph type="body" sz="quarter" idx="12"/>
+          </p:nvPr>
+        </p:nvSpPr>
+        <p:spPr bwMode="auto">
+          <a:xfrm>
+            <a:off x="501650" y="888587"/>
+            <a:ext cx="8315325" cy="3130550"/>
+          </a:xfrm>
+          <a:noFill/>
+          <a:extLst>
+            <a:ext uri="{909E8E84-426E-40DD-AFC4-6F175D3DCCD1}">
+              <a14:hiddenFill xmlns:a14="http://schemas.microsoft.com/office/drawing/2010/main">
+                <a:solidFill>
+                  <a:srgbClr val="FFFFFF"/>
+                </a:solidFill>
+              </a14:hiddenFill>
+            </a:ext>
+            <a:ext uri="{91240B29-F687-4F45-9708-019B960494DF}">
+              <a14:hiddenLine xmlns:a14="http://schemas.microsoft.com/office/drawing/2010/main" w="9525">
+                <a:solidFill>
+                  <a:srgbClr val="000000"/>
+                </a:solidFill>
+                <a:miter lim="800000"/>
+                <a:headEnd/>
+                <a:tailEnd/>
+              </a14:hiddenLine>
+            </a:ext>
+          </a:extLst>
+        </p:spPr>
+        <p:txBody>
+          <a:bodyPr wrap="square" numCol="1" anchor="t" anchorCtr="0" compatLnSpc="1">
+            <a:prstTxWarp prst="textNoShape">
+              <a:avLst/>
+            </a:prstTxWarp>
+          </a:bodyPr>
+          <a:lstStyle/>
+          <a:p>
+            <a:pPr>
+              <a:spcBef>
+                <a:spcPct val="0"/>
+              </a:spcBef>
+            </a:pPr>
+            <a:r>
+              <a:rPr lang="en-US" altLang="en-US" dirty="0" smtClean="0">
+                <a:solidFill>
+                  <a:srgbClr val="FF0000"/>
+                </a:solidFill>
+              </a:rPr>
+              <a:t>Diana to add slides for her models</a:t>
+            </a:r>
+          </a:p>
+          <a:p>
+            <a:pPr>
+              <a:spcBef>
+                <a:spcPct val="0"/>
+              </a:spcBef>
+            </a:pPr>
+            <a:r>
+              <a:rPr lang="en-US" altLang="en-US" dirty="0" smtClean="0">
+                <a:solidFill>
+                  <a:srgbClr val="FF0000"/>
+                </a:solidFill>
+              </a:rPr>
+              <a:t>Andrew to add slides for BART</a:t>
+            </a:r>
+            <a:endParaRPr lang="en-US" altLang="en-US" dirty="0" smtClean="0">
+              <a:solidFill>
+                <a:srgbClr val="FF0000"/>
+              </a:solidFill>
+            </a:endParaRPr>
+          </a:p>
+          <a:p>
+            <a:pPr>
+              <a:spcBef>
+                <a:spcPct val="0"/>
+              </a:spcBef>
+            </a:pPr>
+            <a:endParaRPr lang="en-US" altLang="en-US" sz="1400" b="0" dirty="0" smtClean="0"/>
+          </a:p>
+          <a:p>
+            <a:pPr>
+              <a:spcBef>
+                <a:spcPct val="0"/>
+              </a:spcBef>
+            </a:pPr>
+            <a:endParaRPr lang="en-US" altLang="en-US" dirty="0" smtClean="0"/>
+          </a:p>
+        </p:txBody>
+      </p:sp>
+      <p:sp>
+        <p:nvSpPr>
+          <p:cNvPr id="10242" name="Text Placeholder 2"/>
+          <p:cNvSpPr>
+            <a:spLocks noGrp="1"/>
+          </p:cNvSpPr>
+          <p:nvPr>
+            <p:ph type="body" sz="quarter" idx="14"/>
+          </p:nvPr>
+        </p:nvSpPr>
+        <p:spPr bwMode="auto">
+          <a:xfrm>
+            <a:off x="6176963" y="228600"/>
+            <a:ext cx="2740025" cy="265113"/>
+          </a:xfrm>
+          <a:noFill/>
+          <a:extLst>
+            <a:ext uri="{909E8E84-426E-40DD-AFC4-6F175D3DCCD1}">
+              <a14:hiddenFill xmlns:a14="http://schemas.microsoft.com/office/drawing/2010/main">
+                <a:solidFill>
+                  <a:srgbClr val="FFFFFF"/>
+                </a:solidFill>
+              </a14:hiddenFill>
+            </a:ext>
+            <a:ext uri="{91240B29-F687-4F45-9708-019B960494DF}">
+              <a14:hiddenLine xmlns:a14="http://schemas.microsoft.com/office/drawing/2010/main" w="9525">
+                <a:solidFill>
+                  <a:srgbClr val="000000"/>
+                </a:solidFill>
+                <a:miter lim="800000"/>
+                <a:headEnd/>
+                <a:tailEnd/>
+              </a14:hiddenLine>
+            </a:ext>
+          </a:extLst>
+        </p:spPr>
+        <p:txBody>
+          <a:bodyPr wrap="square" numCol="1" anchor="t" anchorCtr="0" compatLnSpc="1">
+            <a:prstTxWarp prst="textNoShape">
+              <a:avLst/>
+            </a:prstTxWarp>
+          </a:bodyPr>
+          <a:lstStyle/>
+          <a:p>
+            <a:pPr>
+              <a:spcBef>
+                <a:spcPct val="0"/>
+              </a:spcBef>
+            </a:pPr>
+            <a:r>
+              <a:rPr lang="en-US" altLang="en-US" dirty="0" smtClean="0"/>
+              <a:t>Exploratory Data Analysis</a:t>
+            </a:r>
+          </a:p>
+        </p:txBody>
+      </p:sp>
+      <p:sp>
+        <p:nvSpPr>
+          <p:cNvPr id="3" name="Slide Number Placeholder 2"/>
+          <p:cNvSpPr>
+            <a:spLocks noGrp="1"/>
+          </p:cNvSpPr>
+          <p:nvPr>
+            <p:ph type="sldNum" sz="quarter" idx="16"/>
+          </p:nvPr>
+        </p:nvSpPr>
+        <p:spPr/>
+        <p:txBody>
+          <a:bodyPr/>
+          <a:lstStyle>
+            <a:lvl1pPr eaLnBrk="0" hangingPunct="0">
+              <a:defRPr sz="2400">
+                <a:solidFill>
+                  <a:schemeClr val="tx1"/>
+                </a:solidFill>
+                <a:latin typeface="Arial" panose="020B0604020202020204" pitchFamily="34" charset="0"/>
+                <a:ea typeface="MS PGothic" panose="020B0600070205080204" pitchFamily="34" charset="-128"/>
+              </a:defRPr>
+            </a:lvl1pPr>
+            <a:lvl2pPr marL="742950" indent="-285750" eaLnBrk="0" hangingPunct="0">
+              <a:defRPr sz="2400">
+                <a:solidFill>
+                  <a:schemeClr val="tx1"/>
+                </a:solidFill>
+                <a:latin typeface="Arial" panose="020B0604020202020204" pitchFamily="34" charset="0"/>
+                <a:ea typeface="MS PGothic" panose="020B0600070205080204" pitchFamily="34" charset="-128"/>
+              </a:defRPr>
+            </a:lvl2pPr>
+            <a:lvl3pPr marL="1143000" indent="-228600" eaLnBrk="0" hangingPunct="0">
+              <a:defRPr sz="2400">
+                <a:solidFill>
+                  <a:schemeClr val="tx1"/>
+                </a:solidFill>
+                <a:latin typeface="Arial" panose="020B0604020202020204" pitchFamily="34" charset="0"/>
+                <a:ea typeface="MS PGothic" panose="020B0600070205080204" pitchFamily="34" charset="-128"/>
+              </a:defRPr>
+            </a:lvl3pPr>
+            <a:lvl4pPr marL="1600200" indent="-228600" eaLnBrk="0" hangingPunct="0">
+              <a:defRPr sz="2400">
+                <a:solidFill>
+                  <a:schemeClr val="tx1"/>
+                </a:solidFill>
+                <a:latin typeface="Arial" panose="020B0604020202020204" pitchFamily="34" charset="0"/>
+                <a:ea typeface="MS PGothic" panose="020B0600070205080204" pitchFamily="34" charset="-128"/>
+              </a:defRPr>
+            </a:lvl4pPr>
+            <a:lvl5pPr marL="2057400" indent="-228600" eaLnBrk="0" hangingPunct="0">
+              <a:defRPr sz="2400">
+                <a:solidFill>
+                  <a:schemeClr val="tx1"/>
+                </a:solidFill>
+                <a:latin typeface="Arial" panose="020B0604020202020204" pitchFamily="34" charset="0"/>
+                <a:ea typeface="MS PGothic" panose="020B0600070205080204" pitchFamily="34" charset="-128"/>
+              </a:defRPr>
+            </a:lvl5pPr>
+            <a:lvl6pPr marL="2514600" indent="-228600" defTabSz="457200" eaLnBrk="0" fontAlgn="base" hangingPunct="0">
+              <a:spcBef>
+                <a:spcPct val="0"/>
+              </a:spcBef>
+              <a:spcAft>
+                <a:spcPct val="0"/>
+              </a:spcAft>
+              <a:defRPr sz="2400">
+                <a:solidFill>
+                  <a:schemeClr val="tx1"/>
+                </a:solidFill>
+                <a:latin typeface="Arial" panose="020B0604020202020204" pitchFamily="34" charset="0"/>
+                <a:ea typeface="MS PGothic" panose="020B0600070205080204" pitchFamily="34" charset="-128"/>
+              </a:defRPr>
+            </a:lvl6pPr>
+            <a:lvl7pPr marL="2971800" indent="-228600" defTabSz="457200" eaLnBrk="0" fontAlgn="base" hangingPunct="0">
+              <a:spcBef>
+                <a:spcPct val="0"/>
+              </a:spcBef>
+              <a:spcAft>
+                <a:spcPct val="0"/>
+              </a:spcAft>
+              <a:defRPr sz="2400">
+                <a:solidFill>
+                  <a:schemeClr val="tx1"/>
+                </a:solidFill>
+                <a:latin typeface="Arial" panose="020B0604020202020204" pitchFamily="34" charset="0"/>
+                <a:ea typeface="MS PGothic" panose="020B0600070205080204" pitchFamily="34" charset="-128"/>
+              </a:defRPr>
+            </a:lvl7pPr>
+            <a:lvl8pPr marL="3429000" indent="-228600" defTabSz="457200" eaLnBrk="0" fontAlgn="base" hangingPunct="0">
+              <a:spcBef>
+                <a:spcPct val="0"/>
+              </a:spcBef>
+              <a:spcAft>
+                <a:spcPct val="0"/>
+              </a:spcAft>
+              <a:defRPr sz="2400">
+                <a:solidFill>
+                  <a:schemeClr val="tx1"/>
+                </a:solidFill>
+                <a:latin typeface="Arial" panose="020B0604020202020204" pitchFamily="34" charset="0"/>
+                <a:ea typeface="MS PGothic" panose="020B0600070205080204" pitchFamily="34" charset="-128"/>
+              </a:defRPr>
+            </a:lvl8pPr>
+            <a:lvl9pPr marL="3886200" indent="-228600" defTabSz="457200" eaLnBrk="0" fontAlgn="base" hangingPunct="0">
+              <a:spcBef>
+                <a:spcPct val="0"/>
+              </a:spcBef>
+              <a:spcAft>
+                <a:spcPct val="0"/>
+              </a:spcAft>
+              <a:defRPr sz="2400">
+                <a:solidFill>
+                  <a:schemeClr val="tx1"/>
+                </a:solidFill>
+                <a:latin typeface="Arial" panose="020B0604020202020204" pitchFamily="34" charset="0"/>
+                <a:ea typeface="MS PGothic" panose="020B0600070205080204" pitchFamily="34" charset="-128"/>
+              </a:defRPr>
+            </a:lvl9pPr>
+          </a:lstStyle>
+          <a:p>
+            <a:pPr marL="0" marR="0" lvl="0" indent="0" algn="r" defTabSz="457200" rtl="0" eaLnBrk="1" fontAlgn="base" latinLnBrk="0" hangingPunct="1">
+              <a:lnSpc>
+                <a:spcPct val="100000"/>
+              </a:lnSpc>
+              <a:spcBef>
+                <a:spcPct val="0"/>
+              </a:spcBef>
+              <a:spcAft>
+                <a:spcPct val="0"/>
+              </a:spcAft>
+              <a:buClrTx/>
+              <a:buSzTx/>
+              <a:buFontTx/>
+              <a:buNone/>
+              <a:tabLst/>
+              <a:defRPr/>
+            </a:pPr>
+            <a:fld id="{67A30100-1FE8-4BC7-8BBC-5F0E5407A7D5}" type="slidenum">
+              <a:rPr kumimoji="0" lang="en-US" altLang="en-US" sz="1200" b="0" i="0" u="none" strike="noStrike" kern="1200" cap="none" spc="0" normalizeH="0" baseline="0" noProof="0" smtClean="0">
+                <a:ln>
+                  <a:noFill/>
+                </a:ln>
+                <a:solidFill>
+                  <a:srgbClr val="898989"/>
+                </a:solidFill>
+                <a:effectLst/>
+                <a:uLnTx/>
+                <a:uFillTx/>
+                <a:latin typeface="Arial" panose="020B0604020202020204" pitchFamily="34" charset="0"/>
+                <a:ea typeface="MS PGothic" panose="020B0600070205080204" pitchFamily="34" charset="-128"/>
+                <a:cs typeface="+mn-cs"/>
+              </a:rPr>
+              <a:pPr marL="0" marR="0" lvl="0" indent="0" algn="r" defTabSz="457200" rtl="0" eaLnBrk="1" fontAlgn="base" latinLnBrk="0" hangingPunct="1">
+                <a:lnSpc>
+                  <a:spcPct val="100000"/>
+                </a:lnSpc>
+                <a:spcBef>
+                  <a:spcPct val="0"/>
+                </a:spcBef>
+                <a:spcAft>
+                  <a:spcPct val="0"/>
+                </a:spcAft>
+                <a:buClrTx/>
+                <a:buSzTx/>
+                <a:buFontTx/>
+                <a:buNone/>
+                <a:tabLst/>
+                <a:defRPr/>
+              </a:pPr>
+              <a:t>12</a:t>
+            </a:fld>
+            <a:endParaRPr kumimoji="0" lang="en-US" altLang="en-US" sz="1200" b="0" i="0" u="none" strike="noStrike" kern="1200" cap="none" spc="0" normalizeH="0" baseline="0" noProof="0" dirty="0" smtClean="0">
+              <a:ln>
+                <a:noFill/>
+              </a:ln>
+              <a:solidFill>
+                <a:srgbClr val="898989"/>
+              </a:solidFill>
+              <a:effectLst/>
+              <a:uLnTx/>
+              <a:uFillTx/>
+              <a:latin typeface="Arial" panose="020B0604020202020204" pitchFamily="34" charset="0"/>
+              <a:ea typeface="MS PGothic" panose="020B0600070205080204" pitchFamily="34" charset="-128"/>
+              <a:cs typeface="+mn-cs"/>
+            </a:endParaRPr>
+          </a:p>
+        </p:txBody>
+      </p:sp>
+    </p:spTree>
+    <p:extLst>
+      <p:ext uri="{BB962C8B-B14F-4D97-AF65-F5344CB8AC3E}">
+        <p14:creationId xmlns:p14="http://schemas.microsoft.com/office/powerpoint/2010/main" val="264119945"/>
+      </p:ext>
+    </p:extLst>
+  </p:cSld>
+  <p:clrMapOvr>
+    <a:masterClrMapping/>
+  </p:clrMapOvr>
+  <p:timing>
+    <p:tnLst>
+      <p:par>
+        <p:cTn id="1" dur="indefinite" restart="never" nodeType="tmRoot"/>
+      </p:par>
+    </p:tnLst>
+  </p:timing>
+</p:sld>
+</file>
+
+<file path=ppt/slides/slide13.xml><?xml version="1.0" encoding="utf-8"?>
+<p:sld xmlns:a="http://schemas.openxmlformats.org/drawingml/2006/main" xmlns:r="http://schemas.openxmlformats.org/officeDocument/2006/relationships" xmlns:p="http://schemas.openxmlformats.org/presentationml/2006/main">
+  <p:cSld>
+    <p:spTree>
+      <p:nvGrpSpPr>
+        <p:cNvPr id="1" name=""/>
+        <p:cNvGrpSpPr/>
+        <p:nvPr/>
+      </p:nvGrpSpPr>
+      <p:grpSpPr>
+        <a:xfrm>
+          <a:off x="0" y="0"/>
+          <a:ext cx="0" cy="0"/>
+          <a:chOff x="0" y="0"/>
+          <a:chExt cx="0" cy="0"/>
+        </a:xfrm>
+      </p:grpSpPr>
+      <p:sp>
+        <p:nvSpPr>
           <p:cNvPr id="8193" name="Text Placeholder 2"/>
           <p:cNvSpPr>
             <a:spLocks noGrp="1"/>
@@ -3356,12 +4043,179 @@
                 <a:latin typeface="Arial" panose="020B0604020202020204" pitchFamily="34" charset="0"/>
                 <a:cs typeface="Arial" panose="020B0604020202020204" pitchFamily="34" charset="0"/>
               </a:rPr>
-              <a:t>Appendix</a:t>
-            </a:r>
+              <a:t>Next Steps</a:t>
+            </a:r>
+          </a:p>
+          <a:p>
+            <a:pPr>
+              <a:spcBef>
+                <a:spcPct val="0"/>
+              </a:spcBef>
+            </a:pPr>
+            <a:r>
+              <a:rPr lang="en-US" altLang="en-US" sz="1400" b="0" dirty="0" smtClean="0">
+                <a:latin typeface="Arial" panose="020B0604020202020204" pitchFamily="34" charset="0"/>
+                <a:cs typeface="Arial" panose="020B0604020202020204" pitchFamily="34" charset="0"/>
+              </a:rPr>
+              <a:t>Text description here</a:t>
+            </a:r>
+          </a:p>
+          <a:p>
+            <a:pPr>
+              <a:spcBef>
+                <a:spcPct val="0"/>
+              </a:spcBef>
+            </a:pPr>
             <a:endParaRPr lang="en-US" altLang="en-US" dirty="0" smtClean="0">
               <a:latin typeface="Arial" panose="020B0604020202020204" pitchFamily="34" charset="0"/>
               <a:cs typeface="Arial" panose="020B0604020202020204" pitchFamily="34" charset="0"/>
             </a:endParaRPr>
+          </a:p>
+        </p:txBody>
+      </p:sp>
+      <p:pic>
+        <p:nvPicPr>
+          <p:cNvPr id="8194" name="Content Placeholder 5"/>
+          <p:cNvPicPr>
+            <a:picLocks noGrp="1" noChangeAspect="1"/>
+          </p:cNvPicPr>
+          <p:nvPr>
+            <p:ph idx="11"/>
+          </p:nvPr>
+        </p:nvPicPr>
+        <p:blipFill>
+          <a:blip r:embed="rId2">
+            <a:extLst>
+              <a:ext uri="{28A0092B-C50C-407E-A947-70E740481C1C}">
+                <a14:useLocalDpi xmlns:a14="http://schemas.microsoft.com/office/drawing/2010/main" val="0"/>
+              </a:ext>
+            </a:extLst>
+          </a:blip>
+          <a:srcRect/>
+          <a:stretch>
+            <a:fillRect/>
+          </a:stretch>
+        </p:blipFill>
+        <p:spPr bwMode="auto">
+          <a:xfrm>
+            <a:off x="0" y="-7938"/>
+            <a:ext cx="4492625" cy="5167313"/>
+          </a:xfrm>
+          <a:noFill/>
+          <a:extLst>
+            <a:ext uri="{909E8E84-426E-40DD-AFC4-6F175D3DCCD1}">
+              <a14:hiddenFill xmlns:a14="http://schemas.microsoft.com/office/drawing/2010/main">
+                <a:solidFill>
+                  <a:srgbClr val="FFFFFF"/>
+                </a:solidFill>
+              </a14:hiddenFill>
+            </a:ext>
+            <a:ext uri="{91240B29-F687-4F45-9708-019B960494DF}">
+              <a14:hiddenLine xmlns:a14="http://schemas.microsoft.com/office/drawing/2010/main" w="9525">
+                <a:solidFill>
+                  <a:srgbClr val="000000"/>
+                </a:solidFill>
+                <a:miter lim="800000"/>
+                <a:headEnd/>
+                <a:tailEnd/>
+              </a14:hiddenLine>
+            </a:ext>
+          </a:extLst>
+        </p:spPr>
+      </p:pic>
+    </p:spTree>
+    <p:extLst>
+      <p:ext uri="{BB962C8B-B14F-4D97-AF65-F5344CB8AC3E}">
+        <p14:creationId xmlns:p14="http://schemas.microsoft.com/office/powerpoint/2010/main" val="4042838882"/>
+      </p:ext>
+    </p:extLst>
+  </p:cSld>
+  <p:clrMapOvr>
+    <a:masterClrMapping/>
+  </p:clrMapOvr>
+  <p:timing>
+    <p:tnLst>
+      <p:par>
+        <p:cTn id="1" dur="indefinite" restart="never" nodeType="tmRoot"/>
+      </p:par>
+    </p:tnLst>
+  </p:timing>
+</p:sld>
+</file>
+
+<file path=ppt/slides/slide14.xml><?xml version="1.0" encoding="utf-8"?>
+<p:sld xmlns:a="http://schemas.openxmlformats.org/drawingml/2006/main" xmlns:r="http://schemas.openxmlformats.org/officeDocument/2006/relationships" xmlns:p="http://schemas.openxmlformats.org/presentationml/2006/main">
+  <p:cSld>
+    <p:spTree>
+      <p:nvGrpSpPr>
+        <p:cNvPr id="1" name=""/>
+        <p:cNvGrpSpPr/>
+        <p:nvPr/>
+      </p:nvGrpSpPr>
+      <p:grpSpPr>
+        <a:xfrm>
+          <a:off x="0" y="0"/>
+          <a:ext cx="0" cy="0"/>
+          <a:chOff x="0" y="0"/>
+          <a:chExt cx="0" cy="0"/>
+        </a:xfrm>
+      </p:grpSpPr>
+      <p:sp>
+        <p:nvSpPr>
+          <p:cNvPr id="8193" name="Text Placeholder 2"/>
+          <p:cNvSpPr>
+            <a:spLocks noGrp="1"/>
+          </p:cNvSpPr>
+          <p:nvPr>
+            <p:ph type="body" sz="quarter" idx="12"/>
+          </p:nvPr>
+        </p:nvSpPr>
+        <p:spPr bwMode="auto">
+          <a:xfrm>
+            <a:off x="4997450" y="1584325"/>
+            <a:ext cx="3736975" cy="3130550"/>
+          </a:xfrm>
+          <a:noFill/>
+          <a:extLst>
+            <a:ext uri="{909E8E84-426E-40DD-AFC4-6F175D3DCCD1}">
+              <a14:hiddenFill xmlns:a14="http://schemas.microsoft.com/office/drawing/2010/main">
+                <a:solidFill>
+                  <a:srgbClr val="FFFFFF"/>
+                </a:solidFill>
+              </a14:hiddenFill>
+            </a:ext>
+            <a:ext uri="{91240B29-F687-4F45-9708-019B960494DF}">
+              <a14:hiddenLine xmlns:a14="http://schemas.microsoft.com/office/drawing/2010/main" w="9525">
+                <a:solidFill>
+                  <a:srgbClr val="000000"/>
+                </a:solidFill>
+                <a:miter lim="800000"/>
+                <a:headEnd/>
+                <a:tailEnd/>
+              </a14:hiddenLine>
+            </a:ext>
+          </a:extLst>
+        </p:spPr>
+        <p:txBody>
+          <a:bodyPr wrap="square" numCol="1" anchor="t" anchorCtr="0" compatLnSpc="1">
+            <a:prstTxWarp prst="textNoShape">
+              <a:avLst/>
+            </a:prstTxWarp>
+          </a:bodyPr>
+          <a:lstStyle/>
+          <a:p>
+            <a:pPr>
+              <a:spcBef>
+                <a:spcPct val="0"/>
+              </a:spcBef>
+            </a:pPr>
+            <a:r>
+              <a:rPr lang="en-US" altLang="en-US" dirty="0" smtClean="0">
+                <a:latin typeface="Arial" panose="020B0604020202020204" pitchFamily="34" charset="0"/>
+                <a:cs typeface="Arial" panose="020B0604020202020204" pitchFamily="34" charset="0"/>
+              </a:rPr>
+              <a:t>Appendix</a:t>
+            </a:r>
           </a:p>
           <a:p>
             <a:pPr>
@@ -3991,10 +4845,6 @@
               </a:rPr>
               <a:t>Motivation</a:t>
             </a:r>
-            <a:endParaRPr lang="en-US" altLang="en-US" dirty="0" smtClean="0">
-              <a:latin typeface="Arial" panose="020B0604020202020204" pitchFamily="34" charset="0"/>
-              <a:cs typeface="Arial" panose="020B0604020202020204" pitchFamily="34" charset="0"/>
-            </a:endParaRPr>
           </a:p>
           <a:p>
             <a:pPr>
@@ -4158,7 +5008,6 @@
               <a:rPr lang="en-US" altLang="en-US" dirty="0" smtClean="0"/>
               <a:t>What is Airbnb?</a:t>
             </a:r>
-            <a:endParaRPr lang="en-US" altLang="en-US" dirty="0" smtClean="0"/>
           </a:p>
           <a:p>
             <a:pPr>
@@ -4209,7 +5058,6 @@
               <a:rPr lang="en-US" altLang="en-US" sz="1400" b="0" dirty="0" smtClean="0"/>
               <a:t>This project aims to quantify the causal effects of direct marketing ads vs. non-direct marketing ads on user bookings (if any)</a:t>
             </a:r>
-            <a:endParaRPr lang="en-US" altLang="en-US" sz="1400" b="0" dirty="0" smtClean="0"/>
           </a:p>
           <a:p>
             <a:pPr>
@@ -4302,7 +5150,15 @@
             </a:pPr>
             <a:r>
               <a:rPr lang="en-US" altLang="en-US" sz="1400" b="0" dirty="0" smtClean="0"/>
-              <a:t>This project motivates other general questions – how much can marketing influence a potential customer’s purchasing habits, and in turn general consumption behaviors? </a:t>
+              <a:t>This project motivates other general questions – how much can marketing influence a potential customer’s purchasing habits, and in turn general consumption </a:t>
+            </a:r>
+            <a:r>
+              <a:rPr lang="en-US" altLang="en-US" sz="1400" b="0" dirty="0" smtClean="0"/>
+              <a:t>behaviors </a:t>
+            </a:r>
+            <a:r>
+              <a:rPr lang="en-US" altLang="en-US" sz="1400" b="0" smtClean="0"/>
+              <a:t>and trends? </a:t>
             </a:r>
             <a:endParaRPr lang="en-US" altLang="en-US" dirty="0" smtClean="0"/>
           </a:p>
@@ -4384,7 +5240,6 @@
               <a:rPr lang="en-US" altLang="en-US" dirty="0" smtClean="0"/>
               <a:t>Motivation</a:t>
             </a:r>
-            <a:endParaRPr lang="en-US" altLang="en-US" dirty="0" smtClean="0"/>
           </a:p>
         </p:txBody>
       </p:sp>
@@ -4688,10 +5543,6 @@
               </a:rPr>
               <a:t>Data</a:t>
             </a:r>
-            <a:endParaRPr lang="en-US" altLang="en-US" dirty="0" smtClean="0">
-              <a:latin typeface="Arial" panose="020B0604020202020204" pitchFamily="34" charset="0"/>
-              <a:cs typeface="Arial" panose="020B0604020202020204" pitchFamily="34" charset="0"/>
-            </a:endParaRPr>
           </a:p>
           <a:p>
             <a:pPr>
@@ -4860,7 +5711,6 @@
               <a:rPr lang="en-US" altLang="en-US" dirty="0" smtClean="0"/>
               <a:t>Data</a:t>
             </a:r>
-            <a:endParaRPr lang="en-US" altLang="en-US" dirty="0" smtClean="0"/>
           </a:p>
         </p:txBody>
       </p:sp>
@@ -5106,7 +5956,6 @@
               <a:rPr lang="en-US" altLang="en-US" dirty="0" smtClean="0"/>
               <a:t>Dataset</a:t>
             </a:r>
-            <a:endParaRPr lang="en-US" altLang="en-US" dirty="0" smtClean="0"/>
           </a:p>
           <a:p>
             <a:pPr>
@@ -5292,7 +6141,6 @@
                         <a:rPr lang="en-US" sz="1100" baseline="0" dirty="0" smtClean="0"/>
                         <a:t>Language</a:t>
                       </a:r>
-                      <a:endParaRPr lang="en-US" sz="1100" baseline="0" dirty="0" smtClean="0"/>
                     </a:p>
                   </a:txBody>
                   <a:tcPr marL="91436" marR="91436" marT="45729" marB="45729"/>
@@ -5396,7 +6244,6 @@
                         <a:rPr lang="en-US" sz="1100" baseline="0" dirty="0" smtClean="0"/>
                         <a:t>Device Type (Windows Desktop, iPhone, etc.)</a:t>
                       </a:r>
-                      <a:endParaRPr lang="en-US" sz="1100" baseline="0" dirty="0" smtClean="0"/>
                     </a:p>
                     <a:p>
                       <a:pPr marL="0" marR="0" lvl="0" indent="0" algn="l" defTabSz="457200" rtl="0" eaLnBrk="1" fontAlgn="auto" latinLnBrk="0" hangingPunct="1">
@@ -5489,7 +6336,6 @@
                         <a:rPr lang="en-US" sz="1100" baseline="0" dirty="0" smtClean="0"/>
                         <a:t>, google, etc.)</a:t>
                       </a:r>
-                      <a:endParaRPr lang="en-US" sz="1100" baseline="0" dirty="0" smtClean="0"/>
                     </a:p>
                   </a:txBody>
                   <a:tcPr marL="91436" marR="91436" marT="45729" marB="45729"/>
@@ -5528,7 +6374,6 @@
                         <a:rPr lang="en-US" sz="1100" dirty="0" smtClean="0"/>
                         <a:t>Destination Country (US, CA, etc.)</a:t>
                       </a:r>
-                      <a:endParaRPr lang="en-US" sz="1100" dirty="0" smtClean="0"/>
                     </a:p>
                   </a:txBody>
                   <a:tcPr marL="91436" marR="91436" marT="45729" marB="45729"/>
@@ -5675,7 +6520,6 @@
               <a:rPr lang="en-US" altLang="en-US" dirty="0" smtClean="0"/>
               <a:t>Data</a:t>
             </a:r>
-            <a:endParaRPr lang="en-US" altLang="en-US" dirty="0" smtClean="0"/>
           </a:p>
         </p:txBody>
       </p:sp>
@@ -5921,7 +6765,6 @@
               <a:rPr lang="en-US" altLang="en-US" dirty="0" smtClean="0"/>
               <a:t>Dataset used for analysis</a:t>
             </a:r>
-            <a:endParaRPr lang="en-US" altLang="en-US" dirty="0" smtClean="0"/>
           </a:p>
           <a:p>
             <a:pPr indent="0">
@@ -6110,7 +6953,6 @@
                         <a:rPr lang="en-US" sz="1100" baseline="0" dirty="0" smtClean="0"/>
                         <a:t>Language</a:t>
                       </a:r>
-                      <a:endParaRPr lang="en-US" sz="1100" baseline="0" dirty="0" smtClean="0"/>
                     </a:p>
                   </a:txBody>
                   <a:tcPr marL="91436" marR="91436" marT="45729" marB="45729"/>
@@ -6241,7 +7083,6 @@
                         <a:rPr lang="en-US" sz="1100" baseline="0" dirty="0" smtClean="0"/>
                         <a:t>Device Type (Windows Desktop, iPhone, etc.)</a:t>
                       </a:r>
-                      <a:endParaRPr lang="en-US" sz="1100" baseline="0" dirty="0" smtClean="0"/>
                     </a:p>
                     <a:p>
                       <a:pPr marL="0" marR="0" lvl="0" indent="0" algn="l" defTabSz="457200" rtl="0" eaLnBrk="1" fontAlgn="auto" latinLnBrk="0" hangingPunct="1">
@@ -6384,7 +7225,6 @@
                         <a:rPr lang="en-US" sz="1100" baseline="0" dirty="0" smtClean="0"/>
                         <a:t>, google, etc.)</a:t>
                       </a:r>
-                      <a:endParaRPr lang="en-US" sz="1100" baseline="0" dirty="0" smtClean="0"/>
                     </a:p>
                   </a:txBody>
                   <a:tcPr marL="91436" marR="91436" marT="45729" marB="45729"/>
@@ -6444,7 +7284,6 @@
                         <a:rPr lang="en-US" sz="1100" dirty="0" smtClean="0"/>
                         <a:t>Destination Country (US, CA, etc.)</a:t>
                       </a:r>
-                      <a:endParaRPr lang="en-US" sz="1100" dirty="0" smtClean="0"/>
                     </a:p>
                   </a:txBody>
                   <a:tcPr marL="91436" marR="91436" marT="45729" marB="45729"/>
@@ -6466,7 +7305,6 @@
                         <a:rPr lang="en-US" sz="1100" baseline="0" dirty="0" smtClean="0"/>
                         <a:t> destination country into booked / not-booked</a:t>
                       </a:r>
-                      <a:endParaRPr lang="en-US" sz="1100" baseline="0" dirty="0" smtClean="0"/>
                     </a:p>
                   </a:txBody>
                   <a:tcPr marL="91436" marR="91436" marT="45729" marB="45729"/>
@@ -6863,10 +7701,6 @@
               </a:rPr>
               <a:t>Exploratory Data Analysis</a:t>
             </a:r>
-            <a:endParaRPr lang="en-US" altLang="en-US" dirty="0" smtClean="0">
-              <a:latin typeface="Arial" panose="020B0604020202020204" pitchFamily="34" charset="0"/>
-              <a:cs typeface="Arial" panose="020B0604020202020204" pitchFamily="34" charset="0"/>
-            </a:endParaRPr>
           </a:p>
           <a:p>
             <a:pPr>
@@ -7131,7 +7965,6 @@
               <a:rPr lang="en-US" altLang="en-US" dirty="0" smtClean="0"/>
               <a:t>Exploratory Data Analysis</a:t>
             </a:r>
-            <a:endParaRPr lang="en-US" altLang="en-US" dirty="0" smtClean="0"/>
           </a:p>
         </p:txBody>
       </p:sp>

</xml_diff>